<commit_message>
[PREDNASKA a CVIKO 06] Part 2 functional programming
</commit_message>
<xml_diff>
--- a/06-cvicenie/06-cvicenie.pptx
+++ b/06-cvicenie/06-cvicenie.pptx
@@ -6,11 +6,14 @@
   </p:sldMasterIdLst>
   <p:sldIdLst>
     <p:sldId id="256" r:id="rId2"/>
-    <p:sldId id="258" r:id="rId3"/>
-    <p:sldId id="259" r:id="rId4"/>
-    <p:sldId id="260" r:id="rId5"/>
-    <p:sldId id="257" r:id="rId6"/>
-    <p:sldId id="261" r:id="rId7"/>
+    <p:sldId id="264" r:id="rId3"/>
+    <p:sldId id="258" r:id="rId4"/>
+    <p:sldId id="259" r:id="rId5"/>
+    <p:sldId id="260" r:id="rId6"/>
+    <p:sldId id="257" r:id="rId7"/>
+    <p:sldId id="261" r:id="rId8"/>
+    <p:sldId id="262" r:id="rId9"/>
+    <p:sldId id="263" r:id="rId10"/>
   </p:sldIdLst>
   <p:sldSz cx="12192000" cy="6858000"/>
   <p:notesSz cx="6858000" cy="9144000"/>
@@ -109,6 +112,11 @@
       </a:defRPr>
     </a:lvl9pPr>
   </p:defaultTextStyle>
+  <p:extLst>
+    <p:ext uri="{EFAFB233-063F-42B5-8137-9DF3F51BA10A}">
+      <p15:sldGuideLst xmlns:p15="http://schemas.microsoft.com/office/powerpoint/2012/main"/>
+    </p:ext>
+  </p:extLst>
 </p:presentation>
 </file>
 
@@ -261,7 +269,7 @@
           <a:p>
             <a:fld id="{45BDB830-7F99-0E4A-8862-652BDBC500FD}" type="datetimeFigureOut">
               <a:rPr lang="en-GB" smtClean="0"/>
-              <a:t>17/10/2018</a:t>
+              <a:t>21/10/2018</a:t>
             </a:fld>
             <a:endParaRPr lang="en-GB"/>
           </a:p>
@@ -461,7 +469,7 @@
           <a:p>
             <a:fld id="{45BDB830-7F99-0E4A-8862-652BDBC500FD}" type="datetimeFigureOut">
               <a:rPr lang="en-GB" smtClean="0"/>
-              <a:t>17/10/2018</a:t>
+              <a:t>21/10/2018</a:t>
             </a:fld>
             <a:endParaRPr lang="en-GB"/>
           </a:p>
@@ -671,7 +679,7 @@
           <a:p>
             <a:fld id="{45BDB830-7F99-0E4A-8862-652BDBC500FD}" type="datetimeFigureOut">
               <a:rPr lang="en-GB" smtClean="0"/>
-              <a:t>17/10/2018</a:t>
+              <a:t>21/10/2018</a:t>
             </a:fld>
             <a:endParaRPr lang="en-GB"/>
           </a:p>
@@ -871,7 +879,7 @@
           <a:p>
             <a:fld id="{45BDB830-7F99-0E4A-8862-652BDBC500FD}" type="datetimeFigureOut">
               <a:rPr lang="en-GB" smtClean="0"/>
-              <a:t>17/10/2018</a:t>
+              <a:t>21/10/2018</a:t>
             </a:fld>
             <a:endParaRPr lang="en-GB"/>
           </a:p>
@@ -1147,7 +1155,7 @@
           <a:p>
             <a:fld id="{45BDB830-7F99-0E4A-8862-652BDBC500FD}" type="datetimeFigureOut">
               <a:rPr lang="en-GB" smtClean="0"/>
-              <a:t>17/10/2018</a:t>
+              <a:t>21/10/2018</a:t>
             </a:fld>
             <a:endParaRPr lang="en-GB"/>
           </a:p>
@@ -1415,7 +1423,7 @@
           <a:p>
             <a:fld id="{45BDB830-7F99-0E4A-8862-652BDBC500FD}" type="datetimeFigureOut">
               <a:rPr lang="en-GB" smtClean="0"/>
-              <a:t>17/10/2018</a:t>
+              <a:t>21/10/2018</a:t>
             </a:fld>
             <a:endParaRPr lang="en-GB"/>
           </a:p>
@@ -1830,7 +1838,7 @@
           <a:p>
             <a:fld id="{45BDB830-7F99-0E4A-8862-652BDBC500FD}" type="datetimeFigureOut">
               <a:rPr lang="en-GB" smtClean="0"/>
-              <a:t>17/10/2018</a:t>
+              <a:t>21/10/2018</a:t>
             </a:fld>
             <a:endParaRPr lang="en-GB"/>
           </a:p>
@@ -1972,7 +1980,7 @@
           <a:p>
             <a:fld id="{45BDB830-7F99-0E4A-8862-652BDBC500FD}" type="datetimeFigureOut">
               <a:rPr lang="en-GB" smtClean="0"/>
-              <a:t>17/10/2018</a:t>
+              <a:t>21/10/2018</a:t>
             </a:fld>
             <a:endParaRPr lang="en-GB"/>
           </a:p>
@@ -2085,7 +2093,7 @@
           <a:p>
             <a:fld id="{45BDB830-7F99-0E4A-8862-652BDBC500FD}" type="datetimeFigureOut">
               <a:rPr lang="en-GB" smtClean="0"/>
-              <a:t>17/10/2018</a:t>
+              <a:t>21/10/2018</a:t>
             </a:fld>
             <a:endParaRPr lang="en-GB"/>
           </a:p>
@@ -2398,7 +2406,7 @@
           <a:p>
             <a:fld id="{45BDB830-7F99-0E4A-8862-652BDBC500FD}" type="datetimeFigureOut">
               <a:rPr lang="en-GB" smtClean="0"/>
-              <a:t>17/10/2018</a:t>
+              <a:t>21/10/2018</a:t>
             </a:fld>
             <a:endParaRPr lang="en-GB"/>
           </a:p>
@@ -2687,7 +2695,7 @@
           <a:p>
             <a:fld id="{45BDB830-7F99-0E4A-8862-652BDBC500FD}" type="datetimeFigureOut">
               <a:rPr lang="en-GB" smtClean="0"/>
-              <a:t>17/10/2018</a:t>
+              <a:t>21/10/2018</a:t>
             </a:fld>
             <a:endParaRPr lang="en-GB"/>
           </a:p>
@@ -2930,7 +2938,7 @@
           <a:p>
             <a:fld id="{45BDB830-7F99-0E4A-8862-652BDBC500FD}" type="datetimeFigureOut">
               <a:rPr lang="en-GB" smtClean="0"/>
-              <a:t>17/10/2018</a:t>
+              <a:t>21/10/2018</a:t>
             </a:fld>
             <a:endParaRPr lang="en-GB"/>
           </a:p>
@@ -3446,6 +3454,185 @@
           <p:cNvPr id="2" name="Title 1">
             <a:extLst>
               <a:ext uri="{FF2B5EF4-FFF2-40B4-BE49-F238E27FC236}">
+                <a16:creationId xmlns:a16="http://schemas.microsoft.com/office/drawing/2014/main" id="{129E95C0-D58A-2A4C-A076-75C2F0E5BBE8}"/>
+              </a:ext>
+            </a:extLst>
+          </p:cNvPr>
+          <p:cNvSpPr>
+            <a:spLocks noGrp="1"/>
+          </p:cNvSpPr>
+          <p:nvPr>
+            <p:ph type="title"/>
+          </p:nvPr>
+        </p:nvSpPr>
+        <p:spPr/>
+        <p:txBody>
+          <a:bodyPr/>
+          <a:lstStyle/>
+          <a:p>
+            <a:r>
+              <a:rPr lang="en-US" dirty="0"/>
+              <a:t>5 </a:t>
+            </a:r>
+            <a:r>
+              <a:rPr lang="en-US" dirty="0" err="1"/>
+              <a:t>zadani</a:t>
+            </a:r>
+            <a:r>
+              <a:rPr lang="en-US" dirty="0"/>
+              <a:t> 5 </a:t>
+            </a:r>
+            <a:r>
+              <a:rPr lang="en-US" dirty="0" err="1"/>
+              <a:t>bodov</a:t>
+            </a:r>
+            <a:endParaRPr lang="en-US" dirty="0"/>
+          </a:p>
+        </p:txBody>
+      </p:sp>
+      <p:sp>
+        <p:nvSpPr>
+          <p:cNvPr id="3" name="Content Placeholder 2">
+            <a:extLst>
+              <a:ext uri="{FF2B5EF4-FFF2-40B4-BE49-F238E27FC236}">
+                <a16:creationId xmlns:a16="http://schemas.microsoft.com/office/drawing/2014/main" id="{61FC40B2-692B-0241-816C-183643C9F75C}"/>
+              </a:ext>
+            </a:extLst>
+          </p:cNvPr>
+          <p:cNvSpPr>
+            <a:spLocks noGrp="1"/>
+          </p:cNvSpPr>
+          <p:nvPr>
+            <p:ph idx="1"/>
+          </p:nvPr>
+        </p:nvSpPr>
+        <p:spPr/>
+        <p:txBody>
+          <a:bodyPr/>
+          <a:lstStyle/>
+          <a:p>
+            <a:r>
+              <a:rPr lang="en-US" dirty="0"/>
+              <a:t>co </a:t>
+            </a:r>
+            <a:r>
+              <a:rPr lang="en-US" dirty="0" err="1"/>
+              <a:t>cvicime</a:t>
+            </a:r>
+            <a:endParaRPr lang="en-US" dirty="0"/>
+          </a:p>
+          <a:p>
+            <a:pPr marL="514350" indent="-514350">
+              <a:buFont typeface="+mj-lt"/>
+              <a:buAutoNum type="arabicPeriod"/>
+            </a:pPr>
+            <a:r>
+              <a:rPr lang="en-US" dirty="0" err="1"/>
+              <a:t>parametrizacie</a:t>
+            </a:r>
+            <a:r>
+              <a:rPr lang="en-US" dirty="0"/>
+              <a:t> </a:t>
+            </a:r>
+            <a:r>
+              <a:rPr lang="en-US" dirty="0" err="1"/>
+              <a:t>algoritmov</a:t>
+            </a:r>
+            <a:endParaRPr lang="en-US" dirty="0"/>
+          </a:p>
+          <a:p>
+            <a:pPr marL="514350" indent="-514350">
+              <a:buFont typeface="+mj-lt"/>
+              <a:buAutoNum type="arabicPeriod"/>
+            </a:pPr>
+            <a:r>
+              <a:rPr lang="en-US" dirty="0"/>
+              <a:t>function composition</a:t>
+            </a:r>
+          </a:p>
+          <a:p>
+            <a:pPr marL="514350" indent="-514350">
+              <a:buFont typeface="+mj-lt"/>
+              <a:buAutoNum type="arabicPeriod"/>
+            </a:pPr>
+            <a:r>
+              <a:rPr lang="en-US" dirty="0"/>
+              <a:t>reduce vs. for….</a:t>
+            </a:r>
+          </a:p>
+          <a:p>
+            <a:pPr marL="514350" indent="-514350">
+              <a:buFont typeface="+mj-lt"/>
+              <a:buAutoNum type="arabicPeriod"/>
+            </a:pPr>
+            <a:r>
+              <a:rPr lang="en-US" dirty="0" err="1"/>
+              <a:t>rekurzia</a:t>
+            </a:r>
+            <a:r>
+              <a:rPr lang="en-US" dirty="0"/>
+              <a:t> vs. reduce</a:t>
+            </a:r>
+          </a:p>
+          <a:p>
+            <a:pPr marL="514350" indent="-514350">
+              <a:buFont typeface="+mj-lt"/>
+              <a:buAutoNum type="arabicPeriod"/>
+            </a:pPr>
+            <a:r>
+              <a:rPr lang="en-US" dirty="0"/>
+              <a:t>object traversal a immutable</a:t>
+            </a:r>
+          </a:p>
+          <a:p>
+            <a:endParaRPr lang="en-US" dirty="0"/>
+          </a:p>
+          <a:p>
+            <a:endParaRPr lang="en-US" dirty="0"/>
+          </a:p>
+          <a:p>
+            <a:endParaRPr lang="en-US" dirty="0"/>
+          </a:p>
+          <a:p>
+            <a:endParaRPr lang="en-US" dirty="0"/>
+          </a:p>
+        </p:txBody>
+      </p:sp>
+    </p:spTree>
+    <p:extLst>
+      <p:ext uri="{BB962C8B-B14F-4D97-AF65-F5344CB8AC3E}">
+        <p14:creationId xmlns:p14="http://schemas.microsoft.com/office/powerpoint/2010/main" val="2942338930"/>
+      </p:ext>
+    </p:extLst>
+  </p:cSld>
+  <p:clrMapOvr>
+    <a:masterClrMapping/>
+  </p:clrMapOvr>
+</p:sld>
+</file>
+
+<file path=ppt/slides/slide3.xml><?xml version="1.0" encoding="utf-8"?>
+<p:sld xmlns:a="http://schemas.openxmlformats.org/drawingml/2006/main" xmlns:r="http://schemas.openxmlformats.org/officeDocument/2006/relationships" xmlns:p="http://schemas.openxmlformats.org/presentationml/2006/main">
+  <p:cSld>
+    <p:spTree>
+      <p:nvGrpSpPr>
+        <p:cNvPr id="1" name=""/>
+        <p:cNvGrpSpPr/>
+        <p:nvPr/>
+      </p:nvGrpSpPr>
+      <p:grpSpPr>
+        <a:xfrm>
+          <a:off x="0" y="0"/>
+          <a:ext cx="0" cy="0"/>
+          <a:chOff x="0" y="0"/>
+          <a:chExt cx="0" cy="0"/>
+        </a:xfrm>
+      </p:grpSpPr>
+      <p:sp>
+        <p:nvSpPr>
+          <p:cNvPr id="2" name="Title 1">
+            <a:extLst>
+              <a:ext uri="{FF2B5EF4-FFF2-40B4-BE49-F238E27FC236}">
                 <a16:creationId xmlns:a16="http://schemas.microsoft.com/office/drawing/2014/main" id="{58CD86B7-4A90-C84D-B6A9-9073E4DCD210}"/>
               </a:ext>
             </a:extLst>
@@ -3889,7 +4076,7 @@
 </p:sld>
 </file>
 
-<file path=ppt/slides/slide3.xml><?xml version="1.0" encoding="utf-8"?>
+<file path=ppt/slides/slide4.xml><?xml version="1.0" encoding="utf-8"?>
 <p:sld xmlns:a="http://schemas.openxmlformats.org/drawingml/2006/main" xmlns:r="http://schemas.openxmlformats.org/officeDocument/2006/relationships" xmlns:p="http://schemas.openxmlformats.org/presentationml/2006/main">
   <p:cSld>
     <p:spTree>
@@ -4237,7 +4424,7 @@
 </p:sld>
 </file>
 
-<file path=ppt/slides/slide4.xml><?xml version="1.0" encoding="utf-8"?>
+<file path=ppt/slides/slide5.xml><?xml version="1.0" encoding="utf-8"?>
 <p:sld xmlns:a="http://schemas.openxmlformats.org/drawingml/2006/main" xmlns:r="http://schemas.openxmlformats.org/officeDocument/2006/relationships" xmlns:p="http://schemas.openxmlformats.org/presentationml/2006/main">
   <p:cSld>
     <p:spTree>
@@ -4739,7 +4926,7 @@
 </p:sld>
 </file>
 
-<file path=ppt/slides/slide5.xml><?xml version="1.0" encoding="utf-8"?>
+<file path=ppt/slides/slide6.xml><?xml version="1.0" encoding="utf-8"?>
 <p:sld xmlns:a="http://schemas.openxmlformats.org/drawingml/2006/main" xmlns:r="http://schemas.openxmlformats.org/officeDocument/2006/relationships" xmlns:p="http://schemas.openxmlformats.org/presentationml/2006/main">
   <p:cSld>
     <p:spTree>
@@ -4830,7 +5017,7 @@
             </a:r>
             <a:r>
               <a:rPr lang="en-GB" dirty="0"/>
-              <a:t> faster pipe()</a:t>
+              <a:t> pipe()</a:t>
             </a:r>
           </a:p>
           <a:p>
@@ -4861,7 +5048,7 @@
           <a:p>
             <a:r>
               <a:rPr lang="en-GB" b="1" dirty="0"/>
-              <a:t>body: 2b</a:t>
+              <a:t>body: 1b</a:t>
             </a:r>
           </a:p>
         </p:txBody>
@@ -4909,7 +5096,7 @@
 </p:sld>
 </file>
 
-<file path=ppt/slides/slide6.xml><?xml version="1.0" encoding="utf-8"?>
+<file path=ppt/slides/slide7.xml><?xml version="1.0" encoding="utf-8"?>
 <p:sld xmlns:a="http://schemas.openxmlformats.org/drawingml/2006/main" xmlns:r="http://schemas.openxmlformats.org/officeDocument/2006/relationships" xmlns:p="http://schemas.openxmlformats.org/presentationml/2006/main">
   <p:cSld>
     <p:spTree>
@@ -4990,12 +5177,35 @@
         </p:spPr>
         <p:txBody>
           <a:bodyPr>
-            <a:normAutofit fontScale="92500" lnSpcReduction="20000"/>
+            <a:normAutofit fontScale="85000" lnSpcReduction="20000"/>
           </a:bodyPr>
           <a:lstStyle/>
           <a:p>
             <a:r>
               <a:rPr lang="en-GB" dirty="0" err="1"/>
+              <a:t>zdrojak</a:t>
+            </a:r>
+            <a:r>
+              <a:rPr lang="en-GB" dirty="0"/>
+              <a:t> ./</a:t>
+            </a:r>
+            <a:r>
+              <a:rPr lang="en-GB" dirty="0" err="1"/>
+              <a:t>src</a:t>
+            </a:r>
+            <a:r>
+              <a:rPr lang="en-GB" dirty="0"/>
+              <a:t>/</a:t>
+            </a:r>
+            <a:r>
+              <a:rPr lang="en-GB" dirty="0" err="1"/>
+              <a:t>and.js</a:t>
+            </a:r>
+            <a:endParaRPr lang="en-GB" dirty="0"/>
+          </a:p>
+          <a:p>
+            <a:r>
+              <a:rPr lang="en-GB" dirty="0" err="1"/>
               <a:t>pochopit</a:t>
             </a:r>
             <a:r>
@@ -5172,7 +5382,7 @@
           <a:p>
             <a:r>
               <a:rPr lang="en-GB" b="1" dirty="0"/>
-              <a:t>body: 2b, </a:t>
+              <a:t>body: 1b, </a:t>
             </a:r>
             <a:r>
               <a:rPr lang="en-GB" b="1" dirty="0" err="1"/>
@@ -5210,10 +5420,10 @@
       </p:sp>
       <p:pic>
         <p:nvPicPr>
-          <p:cNvPr id="5" name="Picture 4">
-            <a:extLst>
-              <a:ext uri="{FF2B5EF4-FFF2-40B4-BE49-F238E27FC236}">
-                <a16:creationId xmlns:a16="http://schemas.microsoft.com/office/drawing/2014/main" id="{AF6250BA-6CB6-E54E-8980-59799EE8C39B}"/>
+          <p:cNvPr id="4" name="Picture 3">
+            <a:extLst>
+              <a:ext uri="{FF2B5EF4-FFF2-40B4-BE49-F238E27FC236}">
+                <a16:creationId xmlns:a16="http://schemas.microsoft.com/office/drawing/2014/main" id="{5DB34002-754E-6D40-B802-D5BCB872CF6F}"/>
               </a:ext>
             </a:extLst>
           </p:cNvPr>
@@ -5230,18 +5440,833 @@
         </p:blipFill>
         <p:spPr>
           <a:xfrm>
-            <a:off x="5295482" y="1825625"/>
-            <a:ext cx="6514960" cy="1741968"/>
+            <a:off x="4943789" y="1721298"/>
+            <a:ext cx="6590663" cy="1707702"/>
           </a:xfrm>
           <a:prstGeom prst="rect">
             <a:avLst/>
           </a:prstGeom>
         </p:spPr>
       </p:pic>
+      <p:cxnSp>
+        <p:nvCxnSpPr>
+          <p:cNvPr id="7" name="Straight Arrow Connector 6">
+            <a:extLst>
+              <a:ext uri="{FF2B5EF4-FFF2-40B4-BE49-F238E27FC236}">
+                <a16:creationId xmlns:a16="http://schemas.microsoft.com/office/drawing/2014/main" id="{EB73C3BC-713E-9948-8938-10A0BFB999DF}"/>
+              </a:ext>
+            </a:extLst>
+          </p:cNvPr>
+          <p:cNvCxnSpPr/>
+          <p:nvPr/>
+        </p:nvCxnSpPr>
+        <p:spPr>
+          <a:xfrm flipV="1">
+            <a:off x="10118690" y="2270927"/>
+            <a:ext cx="0" cy="1567543"/>
+          </a:xfrm>
+          <a:prstGeom prst="straightConnector1">
+            <a:avLst/>
+          </a:prstGeom>
+          <a:ln>
+            <a:tailEnd type="triangle"/>
+          </a:ln>
+        </p:spPr>
+        <p:style>
+          <a:lnRef idx="1">
+            <a:schemeClr val="accent1"/>
+          </a:lnRef>
+          <a:fillRef idx="0">
+            <a:schemeClr val="accent1"/>
+          </a:fillRef>
+          <a:effectRef idx="0">
+            <a:schemeClr val="accent1"/>
+          </a:effectRef>
+          <a:fontRef idx="minor">
+            <a:schemeClr val="tx1"/>
+          </a:fontRef>
+        </p:style>
+      </p:cxnSp>
+      <p:sp>
+        <p:nvSpPr>
+          <p:cNvPr id="8" name="Content Placeholder 2">
+            <a:extLst>
+              <a:ext uri="{FF2B5EF4-FFF2-40B4-BE49-F238E27FC236}">
+                <a16:creationId xmlns:a16="http://schemas.microsoft.com/office/drawing/2014/main" id="{82627DAF-5634-1048-A2FE-8C04478B7E23}"/>
+              </a:ext>
+            </a:extLst>
+          </p:cNvPr>
+          <p:cNvSpPr txBox="1">
+            <a:spLocks/>
+          </p:cNvSpPr>
+          <p:nvPr/>
+        </p:nvSpPr>
+        <p:spPr>
+          <a:xfrm>
+            <a:off x="4943789" y="3573361"/>
+            <a:ext cx="6590663" cy="2448060"/>
+          </a:xfrm>
+          <a:prstGeom prst="rect">
+            <a:avLst/>
+          </a:prstGeom>
+        </p:spPr>
+        <p:txBody>
+          <a:bodyPr vert="horz" lIns="91440" tIns="45720" rIns="91440" bIns="45720" rtlCol="0">
+            <a:normAutofit fontScale="92500" lnSpcReduction="10000"/>
+          </a:bodyPr>
+          <a:lstStyle>
+            <a:lvl1pPr marL="228600" indent="-228600" algn="l" defTabSz="914400" rtl="0" eaLnBrk="1" latinLnBrk="0" hangingPunct="1">
+              <a:lnSpc>
+                <a:spcPct val="90000"/>
+              </a:lnSpc>
+              <a:spcBef>
+                <a:spcPts val="1000"/>
+              </a:spcBef>
+              <a:buFont typeface="Arial" panose="020B0604020202020204" pitchFamily="34" charset="0"/>
+              <a:buChar char="•"/>
+              <a:defRPr sz="2800" kern="1200">
+                <a:solidFill>
+                  <a:schemeClr val="tx1"/>
+                </a:solidFill>
+                <a:latin typeface="+mn-lt"/>
+                <a:ea typeface="+mn-ea"/>
+                <a:cs typeface="+mn-cs"/>
+              </a:defRPr>
+            </a:lvl1pPr>
+            <a:lvl2pPr marL="685800" indent="-228600" algn="l" defTabSz="914400" rtl="0" eaLnBrk="1" latinLnBrk="0" hangingPunct="1">
+              <a:lnSpc>
+                <a:spcPct val="90000"/>
+              </a:lnSpc>
+              <a:spcBef>
+                <a:spcPts val="500"/>
+              </a:spcBef>
+              <a:buFont typeface="Arial" panose="020B0604020202020204" pitchFamily="34" charset="0"/>
+              <a:buChar char="•"/>
+              <a:defRPr sz="2400" kern="1200">
+                <a:solidFill>
+                  <a:schemeClr val="tx1"/>
+                </a:solidFill>
+                <a:latin typeface="+mn-lt"/>
+                <a:ea typeface="+mn-ea"/>
+                <a:cs typeface="+mn-cs"/>
+              </a:defRPr>
+            </a:lvl2pPr>
+            <a:lvl3pPr marL="1143000" indent="-228600" algn="l" defTabSz="914400" rtl="0" eaLnBrk="1" latinLnBrk="0" hangingPunct="1">
+              <a:lnSpc>
+                <a:spcPct val="90000"/>
+              </a:lnSpc>
+              <a:spcBef>
+                <a:spcPts val="500"/>
+              </a:spcBef>
+              <a:buFont typeface="Arial" panose="020B0604020202020204" pitchFamily="34" charset="0"/>
+              <a:buChar char="•"/>
+              <a:defRPr sz="2000" kern="1200">
+                <a:solidFill>
+                  <a:schemeClr val="tx1"/>
+                </a:solidFill>
+                <a:latin typeface="+mn-lt"/>
+                <a:ea typeface="+mn-ea"/>
+                <a:cs typeface="+mn-cs"/>
+              </a:defRPr>
+            </a:lvl3pPr>
+            <a:lvl4pPr marL="1600200" indent="-228600" algn="l" defTabSz="914400" rtl="0" eaLnBrk="1" latinLnBrk="0" hangingPunct="1">
+              <a:lnSpc>
+                <a:spcPct val="90000"/>
+              </a:lnSpc>
+              <a:spcBef>
+                <a:spcPts val="500"/>
+              </a:spcBef>
+              <a:buFont typeface="Arial" panose="020B0604020202020204" pitchFamily="34" charset="0"/>
+              <a:buChar char="•"/>
+              <a:defRPr sz="1800" kern="1200">
+                <a:solidFill>
+                  <a:schemeClr val="tx1"/>
+                </a:solidFill>
+                <a:latin typeface="+mn-lt"/>
+                <a:ea typeface="+mn-ea"/>
+                <a:cs typeface="+mn-cs"/>
+              </a:defRPr>
+            </a:lvl4pPr>
+            <a:lvl5pPr marL="2057400" indent="-228600" algn="l" defTabSz="914400" rtl="0" eaLnBrk="1" latinLnBrk="0" hangingPunct="1">
+              <a:lnSpc>
+                <a:spcPct val="90000"/>
+              </a:lnSpc>
+              <a:spcBef>
+                <a:spcPts val="500"/>
+              </a:spcBef>
+              <a:buFont typeface="Arial" panose="020B0604020202020204" pitchFamily="34" charset="0"/>
+              <a:buChar char="•"/>
+              <a:defRPr sz="1800" kern="1200">
+                <a:solidFill>
+                  <a:schemeClr val="tx1"/>
+                </a:solidFill>
+                <a:latin typeface="+mn-lt"/>
+                <a:ea typeface="+mn-ea"/>
+                <a:cs typeface="+mn-cs"/>
+              </a:defRPr>
+            </a:lvl5pPr>
+            <a:lvl6pPr marL="2514600" indent="-228600" algn="l" defTabSz="914400" rtl="0" eaLnBrk="1" latinLnBrk="0" hangingPunct="1">
+              <a:lnSpc>
+                <a:spcPct val="90000"/>
+              </a:lnSpc>
+              <a:spcBef>
+                <a:spcPts val="500"/>
+              </a:spcBef>
+              <a:buFont typeface="Arial" panose="020B0604020202020204" pitchFamily="34" charset="0"/>
+              <a:buChar char="•"/>
+              <a:defRPr sz="1800" kern="1200">
+                <a:solidFill>
+                  <a:schemeClr val="tx1"/>
+                </a:solidFill>
+                <a:latin typeface="+mn-lt"/>
+                <a:ea typeface="+mn-ea"/>
+                <a:cs typeface="+mn-cs"/>
+              </a:defRPr>
+            </a:lvl6pPr>
+            <a:lvl7pPr marL="2971800" indent="-228600" algn="l" defTabSz="914400" rtl="0" eaLnBrk="1" latinLnBrk="0" hangingPunct="1">
+              <a:lnSpc>
+                <a:spcPct val="90000"/>
+              </a:lnSpc>
+              <a:spcBef>
+                <a:spcPts val="500"/>
+              </a:spcBef>
+              <a:buFont typeface="Arial" panose="020B0604020202020204" pitchFamily="34" charset="0"/>
+              <a:buChar char="•"/>
+              <a:defRPr sz="1800" kern="1200">
+                <a:solidFill>
+                  <a:schemeClr val="tx1"/>
+                </a:solidFill>
+                <a:latin typeface="+mn-lt"/>
+                <a:ea typeface="+mn-ea"/>
+                <a:cs typeface="+mn-cs"/>
+              </a:defRPr>
+            </a:lvl7pPr>
+            <a:lvl8pPr marL="3429000" indent="-228600" algn="l" defTabSz="914400" rtl="0" eaLnBrk="1" latinLnBrk="0" hangingPunct="1">
+              <a:lnSpc>
+                <a:spcPct val="90000"/>
+              </a:lnSpc>
+              <a:spcBef>
+                <a:spcPts val="500"/>
+              </a:spcBef>
+              <a:buFont typeface="Arial" panose="020B0604020202020204" pitchFamily="34" charset="0"/>
+              <a:buChar char="•"/>
+              <a:defRPr sz="1800" kern="1200">
+                <a:solidFill>
+                  <a:schemeClr val="tx1"/>
+                </a:solidFill>
+                <a:latin typeface="+mn-lt"/>
+                <a:ea typeface="+mn-ea"/>
+                <a:cs typeface="+mn-cs"/>
+              </a:defRPr>
+            </a:lvl8pPr>
+            <a:lvl9pPr marL="3886200" indent="-228600" algn="l" defTabSz="914400" rtl="0" eaLnBrk="1" latinLnBrk="0" hangingPunct="1">
+              <a:lnSpc>
+                <a:spcPct val="90000"/>
+              </a:lnSpc>
+              <a:spcBef>
+                <a:spcPts val="500"/>
+              </a:spcBef>
+              <a:buFont typeface="Arial" panose="020B0604020202020204" pitchFamily="34" charset="0"/>
+              <a:buChar char="•"/>
+              <a:defRPr sz="1800" kern="1200">
+                <a:solidFill>
+                  <a:schemeClr val="tx1"/>
+                </a:solidFill>
+                <a:latin typeface="+mn-lt"/>
+                <a:ea typeface="+mn-ea"/>
+                <a:cs typeface="+mn-cs"/>
+              </a:defRPr>
+            </a:lvl9pPr>
+          </a:lstStyle>
+          <a:p>
+            <a:r>
+              <a:rPr lang="en-GB" dirty="0" err="1"/>
+              <a:t>naco</a:t>
+            </a:r>
+            <a:r>
+              <a:rPr lang="en-GB" dirty="0"/>
+              <a:t> </a:t>
+            </a:r>
+            <a:r>
+              <a:rPr lang="en-GB" dirty="0" err="1"/>
+              <a:t>je</a:t>
+            </a:r>
+            <a:r>
+              <a:rPr lang="en-GB" dirty="0"/>
+              <a:t> v tom reduce </a:t>
+            </a:r>
+            <a:r>
+              <a:rPr lang="en-GB" dirty="0" err="1"/>
+              <a:t>volanie</a:t>
+            </a:r>
+            <a:r>
+              <a:rPr lang="en-GB" dirty="0"/>
+              <a:t> </a:t>
+            </a:r>
+            <a:r>
+              <a:rPr lang="en-GB" dirty="0" err="1"/>
+              <a:t>init</a:t>
+            </a:r>
+            <a:r>
+              <a:rPr lang="en-GB" dirty="0"/>
+              <a:t> ?, </a:t>
+            </a:r>
+            <a:r>
+              <a:rPr lang="en-GB" dirty="0" err="1"/>
+              <a:t>ake</a:t>
+            </a:r>
+            <a:r>
+              <a:rPr lang="en-GB" dirty="0"/>
+              <a:t> </a:t>
+            </a:r>
+            <a:r>
+              <a:rPr lang="en-GB" dirty="0" err="1"/>
+              <a:t>pripady</a:t>
+            </a:r>
+            <a:r>
+              <a:rPr lang="en-GB" dirty="0"/>
+              <a:t> to </a:t>
+            </a:r>
+            <a:r>
+              <a:rPr lang="en-GB" dirty="0" err="1"/>
+              <a:t>pokryva</a:t>
+            </a:r>
+            <a:r>
+              <a:rPr lang="en-GB" dirty="0"/>
+              <a:t> ? slide z </a:t>
+            </a:r>
+            <a:r>
+              <a:rPr lang="en-GB" dirty="0" err="1"/>
+              <a:t>prednasky</a:t>
+            </a:r>
+            <a:r>
+              <a:rPr lang="en-GB" dirty="0"/>
+              <a:t>….</a:t>
+            </a:r>
+          </a:p>
+          <a:p>
+            <a:r>
+              <a:rPr lang="en-GB" dirty="0" err="1"/>
+              <a:t>ako</a:t>
+            </a:r>
+            <a:r>
+              <a:rPr lang="en-GB" dirty="0"/>
+              <a:t> </a:t>
+            </a:r>
+            <a:r>
+              <a:rPr lang="en-GB" dirty="0" err="1"/>
+              <a:t>inak</a:t>
+            </a:r>
+            <a:r>
+              <a:rPr lang="en-GB" dirty="0"/>
+              <a:t> </a:t>
+            </a:r>
+            <a:r>
+              <a:rPr lang="en-GB" dirty="0" err="1"/>
+              <a:t>este</a:t>
+            </a:r>
+            <a:r>
+              <a:rPr lang="en-GB" dirty="0"/>
+              <a:t> </a:t>
+            </a:r>
+            <a:r>
+              <a:rPr lang="en-GB" dirty="0" err="1"/>
+              <a:t>dokazete</a:t>
+            </a:r>
+            <a:r>
+              <a:rPr lang="en-GB" dirty="0"/>
+              <a:t> </a:t>
+            </a:r>
+            <a:r>
+              <a:rPr lang="en-GB" dirty="0" err="1"/>
+              <a:t>napisat</a:t>
+            </a:r>
+            <a:r>
+              <a:rPr lang="en-GB" dirty="0"/>
+              <a:t> ten reduce ? </a:t>
+            </a:r>
+          </a:p>
+          <a:p>
+            <a:r>
+              <a:rPr lang="en-GB" dirty="0" err="1"/>
+              <a:t>potrebujem</a:t>
+            </a:r>
+            <a:r>
+              <a:rPr lang="en-GB" dirty="0"/>
+              <a:t> </a:t>
+            </a:r>
+            <a:r>
+              <a:rPr lang="en-GB" dirty="0" err="1"/>
+              <a:t>konverziu</a:t>
+            </a:r>
+            <a:r>
+              <a:rPr lang="en-GB" dirty="0"/>
+              <a:t> </a:t>
+            </a:r>
+            <a:r>
+              <a:rPr lang="en-GB" dirty="0" err="1"/>
+              <a:t>na</a:t>
+            </a:r>
+            <a:r>
+              <a:rPr lang="en-GB" dirty="0"/>
+              <a:t> </a:t>
+            </a:r>
+            <a:r>
+              <a:rPr lang="en-GB" dirty="0" err="1"/>
+              <a:t>boolean</a:t>
+            </a:r>
+            <a:r>
+              <a:rPr lang="en-GB" dirty="0"/>
+              <a:t> v </a:t>
+            </a:r>
+            <a:r>
+              <a:rPr lang="en-GB" dirty="0" err="1"/>
+              <a:t>kazdom</a:t>
+            </a:r>
+            <a:r>
+              <a:rPr lang="en-GB" dirty="0"/>
+              <a:t> </a:t>
+            </a:r>
+            <a:r>
+              <a:rPr lang="en-GB" dirty="0" err="1"/>
+              <a:t>volani</a:t>
+            </a:r>
+            <a:r>
+              <a:rPr lang="en-GB" dirty="0"/>
+              <a:t>, ci by mi </a:t>
+            </a:r>
+            <a:r>
+              <a:rPr lang="en-GB" dirty="0" err="1"/>
+              <a:t>stacila</a:t>
+            </a:r>
+            <a:r>
+              <a:rPr lang="en-GB" dirty="0"/>
+              <a:t> </a:t>
+            </a:r>
+            <a:r>
+              <a:rPr lang="en-GB" dirty="0" err="1"/>
+              <a:t>iba</a:t>
+            </a:r>
+            <a:r>
+              <a:rPr lang="en-GB" dirty="0"/>
+              <a:t> </a:t>
+            </a:r>
+            <a:r>
+              <a:rPr lang="en-GB" dirty="0" err="1"/>
+              <a:t>nad</a:t>
+            </a:r>
+            <a:r>
+              <a:rPr lang="en-GB" dirty="0"/>
+              <a:t> </a:t>
+            </a:r>
+            <a:r>
+              <a:rPr lang="en-GB" dirty="0" err="1"/>
+              <a:t>finalnou</a:t>
+            </a:r>
+            <a:r>
+              <a:rPr lang="en-GB" dirty="0"/>
+              <a:t> return </a:t>
+            </a:r>
+            <a:r>
+              <a:rPr lang="en-GB"/>
+              <a:t>value…..?</a:t>
+            </a:r>
+            <a:endParaRPr lang="en-GB" dirty="0"/>
+          </a:p>
+        </p:txBody>
+      </p:sp>
     </p:spTree>
     <p:extLst>
       <p:ext uri="{BB962C8B-B14F-4D97-AF65-F5344CB8AC3E}">
         <p14:creationId xmlns:p14="http://schemas.microsoft.com/office/powerpoint/2010/main" val="1786307251"/>
+      </p:ext>
+    </p:extLst>
+  </p:cSld>
+  <p:clrMapOvr>
+    <a:masterClrMapping/>
+  </p:clrMapOvr>
+</p:sld>
+</file>
+
+<file path=ppt/slides/slide8.xml><?xml version="1.0" encoding="utf-8"?>
+<p:sld xmlns:a="http://schemas.openxmlformats.org/drawingml/2006/main" xmlns:r="http://schemas.openxmlformats.org/officeDocument/2006/relationships" xmlns:p="http://schemas.openxmlformats.org/presentationml/2006/main">
+  <p:cSld>
+    <p:spTree>
+      <p:nvGrpSpPr>
+        <p:cNvPr id="1" name=""/>
+        <p:cNvGrpSpPr/>
+        <p:nvPr/>
+      </p:nvGrpSpPr>
+      <p:grpSpPr>
+        <a:xfrm>
+          <a:off x="0" y="0"/>
+          <a:ext cx="0" cy="0"/>
+          <a:chOff x="0" y="0"/>
+          <a:chExt cx="0" cy="0"/>
+        </a:xfrm>
+      </p:grpSpPr>
+      <p:sp>
+        <p:nvSpPr>
+          <p:cNvPr id="2" name="Title 1">
+            <a:extLst>
+              <a:ext uri="{FF2B5EF4-FFF2-40B4-BE49-F238E27FC236}">
+                <a16:creationId xmlns:a16="http://schemas.microsoft.com/office/drawing/2014/main" id="{656667D1-A4FB-8A4F-834C-D64476CDBAB6}"/>
+              </a:ext>
+            </a:extLst>
+          </p:cNvPr>
+          <p:cNvSpPr>
+            <a:spLocks noGrp="1"/>
+          </p:cNvSpPr>
+          <p:nvPr>
+            <p:ph type="title"/>
+          </p:nvPr>
+        </p:nvSpPr>
+        <p:spPr/>
+        <p:txBody>
+          <a:bodyPr/>
+          <a:lstStyle/>
+          <a:p>
+            <a:r>
+              <a:rPr lang="en-US" dirty="0" err="1"/>
+              <a:t>zadanie</a:t>
+            </a:r>
+            <a:r>
+              <a:rPr lang="en-US" dirty="0"/>
+              <a:t> 06-04 deep freeze</a:t>
+            </a:r>
+          </a:p>
+        </p:txBody>
+      </p:sp>
+      <p:sp>
+        <p:nvSpPr>
+          <p:cNvPr id="3" name="Content Placeholder 2">
+            <a:extLst>
+              <a:ext uri="{FF2B5EF4-FFF2-40B4-BE49-F238E27FC236}">
+                <a16:creationId xmlns:a16="http://schemas.microsoft.com/office/drawing/2014/main" id="{57A93FC3-1FE1-4042-9EEE-D596D8340152}"/>
+              </a:ext>
+            </a:extLst>
+          </p:cNvPr>
+          <p:cNvSpPr>
+            <a:spLocks noGrp="1"/>
+          </p:cNvSpPr>
+          <p:nvPr>
+            <p:ph idx="1"/>
+          </p:nvPr>
+        </p:nvSpPr>
+        <p:spPr/>
+        <p:txBody>
+          <a:bodyPr/>
+          <a:lstStyle/>
+          <a:p>
+            <a:r>
+              <a:rPr lang="en-US" dirty="0" err="1"/>
+              <a:t>Implementujte</a:t>
+            </a:r>
+            <a:r>
+              <a:rPr lang="en-US" dirty="0"/>
+              <a:t> </a:t>
+            </a:r>
+            <a:r>
+              <a:rPr lang="en-US" dirty="0" err="1"/>
+              <a:t>deepFreeze</a:t>
+            </a:r>
+            <a:r>
+              <a:rPr lang="en-US" dirty="0"/>
+              <a:t> </a:t>
+            </a:r>
+          </a:p>
+          <a:p>
+            <a:pPr lvl="1"/>
+            <a:r>
+              <a:rPr lang="en-US" dirty="0" err="1"/>
+              <a:t>pomocoy</a:t>
+            </a:r>
+            <a:r>
+              <a:rPr lang="en-US" dirty="0"/>
+              <a:t> </a:t>
+            </a:r>
+            <a:r>
+              <a:rPr lang="en-US" dirty="0" err="1"/>
+              <a:t>kniznice</a:t>
+            </a:r>
+            <a:r>
+              <a:rPr lang="en-US" dirty="0"/>
+              <a:t> traverse</a:t>
+            </a:r>
+          </a:p>
+          <a:p>
+            <a:pPr lvl="1"/>
+            <a:r>
+              <a:rPr lang="en-US" dirty="0" err="1"/>
+              <a:t>npm</a:t>
+            </a:r>
+            <a:r>
+              <a:rPr lang="en-US" dirty="0"/>
+              <a:t> install –save traverse</a:t>
+            </a:r>
+          </a:p>
+          <a:p>
+            <a:pPr lvl="1"/>
+            <a:r>
+              <a:rPr lang="en-US" dirty="0" err="1"/>
+              <a:t>pozriet</a:t>
+            </a:r>
+            <a:r>
+              <a:rPr lang="en-US" dirty="0"/>
+              <a:t> </a:t>
+            </a:r>
+            <a:r>
+              <a:rPr lang="en-US" dirty="0" err="1"/>
+              <a:t>si</a:t>
+            </a:r>
+            <a:r>
+              <a:rPr lang="en-US" dirty="0"/>
+              <a:t> </a:t>
+            </a:r>
+            <a:r>
+              <a:rPr lang="en-US" dirty="0" err="1"/>
+              <a:t>slajdy</a:t>
+            </a:r>
+            <a:r>
+              <a:rPr lang="en-US" dirty="0"/>
+              <a:t> 71 a 72, </a:t>
+            </a:r>
+            <a:r>
+              <a:rPr lang="en-US" dirty="0" err="1"/>
+              <a:t>na</a:t>
+            </a:r>
+            <a:r>
+              <a:rPr lang="en-US" dirty="0"/>
+              <a:t> 71 </a:t>
+            </a:r>
+            <a:r>
+              <a:rPr lang="en-US" dirty="0" err="1"/>
+              <a:t>je</a:t>
+            </a:r>
+            <a:r>
+              <a:rPr lang="en-US" dirty="0"/>
+              <a:t> deep freeze</a:t>
+            </a:r>
+          </a:p>
+          <a:p>
+            <a:r>
+              <a:rPr lang="en-US" b="1" dirty="0"/>
+              <a:t>body 1b</a:t>
+            </a:r>
+          </a:p>
+        </p:txBody>
+      </p:sp>
+    </p:spTree>
+    <p:extLst>
+      <p:ext uri="{BB962C8B-B14F-4D97-AF65-F5344CB8AC3E}">
+        <p14:creationId xmlns:p14="http://schemas.microsoft.com/office/powerpoint/2010/main" val="2431757695"/>
+      </p:ext>
+    </p:extLst>
+  </p:cSld>
+  <p:clrMapOvr>
+    <a:masterClrMapping/>
+  </p:clrMapOvr>
+</p:sld>
+</file>
+
+<file path=ppt/slides/slide9.xml><?xml version="1.0" encoding="utf-8"?>
+<p:sld xmlns:a="http://schemas.openxmlformats.org/drawingml/2006/main" xmlns:r="http://schemas.openxmlformats.org/officeDocument/2006/relationships" xmlns:p="http://schemas.openxmlformats.org/presentationml/2006/main">
+  <p:cSld>
+    <p:spTree>
+      <p:nvGrpSpPr>
+        <p:cNvPr id="1" name=""/>
+        <p:cNvGrpSpPr/>
+        <p:nvPr/>
+      </p:nvGrpSpPr>
+      <p:grpSpPr>
+        <a:xfrm>
+          <a:off x="0" y="0"/>
+          <a:ext cx="0" cy="0"/>
+          <a:chOff x="0" y="0"/>
+          <a:chExt cx="0" cy="0"/>
+        </a:xfrm>
+      </p:grpSpPr>
+      <p:sp>
+        <p:nvSpPr>
+          <p:cNvPr id="2" name="Title 1">
+            <a:extLst>
+              <a:ext uri="{FF2B5EF4-FFF2-40B4-BE49-F238E27FC236}">
+                <a16:creationId xmlns:a16="http://schemas.microsoft.com/office/drawing/2014/main" id="{656667D1-A4FB-8A4F-834C-D64476CDBAB6}"/>
+              </a:ext>
+            </a:extLst>
+          </p:cNvPr>
+          <p:cNvSpPr>
+            <a:spLocks noGrp="1"/>
+          </p:cNvSpPr>
+          <p:nvPr>
+            <p:ph type="title"/>
+          </p:nvPr>
+        </p:nvSpPr>
+        <p:spPr/>
+        <p:txBody>
+          <a:bodyPr/>
+          <a:lstStyle/>
+          <a:p>
+            <a:r>
+              <a:rPr lang="en-US" dirty="0" err="1"/>
+              <a:t>zadanie</a:t>
+            </a:r>
+            <a:r>
+              <a:rPr lang="en-US" dirty="0"/>
+              <a:t> 06-05 deep freeze </a:t>
+            </a:r>
+            <a:r>
+              <a:rPr lang="en-US" dirty="0" err="1"/>
+              <a:t>vracajuci</a:t>
+            </a:r>
+            <a:r>
+              <a:rPr lang="en-US" dirty="0"/>
+              <a:t> </a:t>
+            </a:r>
+            <a:r>
+              <a:rPr lang="en-US" dirty="0" err="1"/>
+              <a:t>freeznutu</a:t>
+            </a:r>
+            <a:r>
+              <a:rPr lang="en-US" dirty="0"/>
+              <a:t> deep </a:t>
+            </a:r>
+            <a:r>
+              <a:rPr lang="en-US" dirty="0" err="1"/>
+              <a:t>kopiu</a:t>
+            </a:r>
+            <a:r>
+              <a:rPr lang="en-US" dirty="0"/>
+              <a:t> </a:t>
+            </a:r>
+            <a:r>
+              <a:rPr lang="en-US" dirty="0" err="1"/>
+              <a:t>objektu</a:t>
+            </a:r>
+            <a:endParaRPr lang="en-US" dirty="0"/>
+          </a:p>
+        </p:txBody>
+      </p:sp>
+      <p:sp>
+        <p:nvSpPr>
+          <p:cNvPr id="3" name="Content Placeholder 2">
+            <a:extLst>
+              <a:ext uri="{FF2B5EF4-FFF2-40B4-BE49-F238E27FC236}">
+                <a16:creationId xmlns:a16="http://schemas.microsoft.com/office/drawing/2014/main" id="{57A93FC3-1FE1-4042-9EEE-D596D8340152}"/>
+              </a:ext>
+            </a:extLst>
+          </p:cNvPr>
+          <p:cNvSpPr>
+            <a:spLocks noGrp="1"/>
+          </p:cNvSpPr>
+          <p:nvPr>
+            <p:ph idx="1"/>
+          </p:nvPr>
+        </p:nvSpPr>
+        <p:spPr/>
+        <p:txBody>
+          <a:bodyPr/>
+          <a:lstStyle/>
+          <a:p>
+            <a:r>
+              <a:rPr lang="en-US" dirty="0" err="1"/>
+              <a:t>deepFreeze</a:t>
+            </a:r>
+            <a:r>
+              <a:rPr lang="en-US" dirty="0"/>
+              <a:t> z </a:t>
+            </a:r>
+            <a:r>
+              <a:rPr lang="en-US" dirty="0" err="1"/>
+              <a:t>parametrom</a:t>
+            </a:r>
+            <a:r>
+              <a:rPr lang="en-US" dirty="0"/>
+              <a:t> </a:t>
+            </a:r>
+            <a:r>
+              <a:rPr lang="en-US" dirty="0" err="1"/>
+              <a:t>deepFreeze</a:t>
+            </a:r>
+            <a:r>
+              <a:rPr lang="en-US" dirty="0"/>
+              <a:t>(o,{</a:t>
+            </a:r>
+            <a:r>
+              <a:rPr lang="en-US" dirty="0" err="1"/>
+              <a:t>clone:true</a:t>
+            </a:r>
+            <a:r>
+              <a:rPr lang="en-US" dirty="0"/>
+              <a:t>})</a:t>
+            </a:r>
+          </a:p>
+          <a:p>
+            <a:r>
+              <a:rPr lang="en-US" dirty="0"/>
+              <a:t>v tom </a:t>
+            </a:r>
+            <a:r>
+              <a:rPr lang="en-US" dirty="0" err="1"/>
+              <a:t>istom</a:t>
+            </a:r>
+            <a:r>
+              <a:rPr lang="en-US" dirty="0"/>
+              <a:t> </a:t>
+            </a:r>
+            <a:r>
+              <a:rPr lang="en-US" dirty="0" err="1"/>
+              <a:t>subore</a:t>
+            </a:r>
+            <a:r>
+              <a:rPr lang="en-US" dirty="0"/>
+              <a:t> </a:t>
+            </a:r>
+            <a:r>
+              <a:rPr lang="en-US" dirty="0" err="1"/>
+              <a:t>deepFreeze.js</a:t>
+            </a:r>
+            <a:endParaRPr lang="en-US" dirty="0"/>
+          </a:p>
+          <a:p>
+            <a:r>
+              <a:rPr lang="en-US" dirty="0"/>
+              <a:t>+ </a:t>
+            </a:r>
+            <a:r>
+              <a:rPr lang="en-US" dirty="0" err="1"/>
+              <a:t>doplneny</a:t>
+            </a:r>
+            <a:r>
+              <a:rPr lang="en-US" dirty="0"/>
+              <a:t> test </a:t>
+            </a:r>
+            <a:r>
+              <a:rPr lang="en-US" dirty="0" err="1"/>
+              <a:t>aj</a:t>
+            </a:r>
+            <a:r>
+              <a:rPr lang="en-US" dirty="0"/>
+              <a:t> o toto </a:t>
+            </a:r>
+            <a:r>
+              <a:rPr lang="en-US" dirty="0" err="1"/>
+              <a:t>spravanie</a:t>
+            </a:r>
+            <a:endParaRPr lang="en-US" dirty="0"/>
+          </a:p>
+          <a:p>
+            <a:r>
+              <a:rPr lang="en-US" b="1" dirty="0"/>
+              <a:t>body 1b</a:t>
+            </a:r>
+          </a:p>
+        </p:txBody>
+      </p:sp>
+    </p:spTree>
+    <p:extLst>
+      <p:ext uri="{BB962C8B-B14F-4D97-AF65-F5344CB8AC3E}">
+        <p14:creationId xmlns:p14="http://schemas.microsoft.com/office/powerpoint/2010/main" val="2184265642"/>
       </p:ext>
     </p:extLst>
   </p:cSld>

</xml_diff>